<commit_message>
Only send a number
</commit_message>
<xml_diff>
--- a/PBLF2015-Final.pptx
+++ b/PBLF2015-Final.pptx
@@ -5,10 +5,10 @@
     <p:sldMasterId id="2147483660" r:id="rId2"/>
   </p:sldMasterIdLst>
   <p:notesMasterIdLst>
-    <p:notesMasterId r:id="rId14"/>
+    <p:notesMasterId r:id="rId15"/>
   </p:notesMasterIdLst>
   <p:handoutMasterIdLst>
-    <p:handoutMasterId r:id="rId15"/>
+    <p:handoutMasterId r:id="rId16"/>
   </p:handoutMasterIdLst>
   <p:sldIdLst>
     <p:sldId id="257" r:id="rId3"/>
@@ -21,7 +21,8 @@
     <p:sldId id="277" r:id="rId10"/>
     <p:sldId id="278" r:id="rId11"/>
     <p:sldId id="279" r:id="rId12"/>
-    <p:sldId id="280" r:id="rId13"/>
+    <p:sldId id="281" r:id="rId13"/>
+    <p:sldId id="280" r:id="rId14"/>
   </p:sldIdLst>
   <p:sldSz cx="12188825" cy="6858000"/>
   <p:notesSz cx="7010400" cy="9296400"/>
@@ -235,7 +236,7 @@
           <a:p>
             <a:fld id="{FE5B4EDC-59C0-49C7-8ADA-5A781B329E02}" type="datetimeFigureOut">
               <a:rPr lang="en-US"/>
-              <a:t>2/9/2016</a:t>
+              <a:t>2/10/2016</a:t>
             </a:fld>
             <a:endParaRPr/>
           </a:p>
@@ -400,7 +401,7 @@
           <a:p>
             <a:fld id="{F2D8D46A-B586-417D-BFBD-8C8FE0AAF762}" type="datetimeFigureOut">
               <a:rPr lang="en-US"/>
-              <a:t>2/9/2016</a:t>
+              <a:t>2/10/2016</a:t>
             </a:fld>
             <a:endParaRPr/>
           </a:p>
@@ -1237,6 +1238,90 @@
             <a:fld id="{3EBA5BD7-F043-4D1B-AA17-CD412FC534DE}" type="slidenum">
               <a:rPr lang="en-US" smtClean="0"/>
               <a:t>11</a:t>
+            </a:fld>
+            <a:endParaRPr lang="en-US"/>
+          </a:p>
+        </p:txBody>
+      </p:sp>
+    </p:spTree>
+    <p:extLst>
+      <p:ext uri="{BB962C8B-B14F-4D97-AF65-F5344CB8AC3E}">
+        <p14:creationId xmlns:p14="http://schemas.microsoft.com/office/powerpoint/2010/main" val="4014227071"/>
+      </p:ext>
+    </p:extLst>
+  </p:cSld>
+  <p:clrMapOvr>
+    <a:masterClrMapping/>
+  </p:clrMapOvr>
+</p:notes>
+</file>
+
+<file path=ppt/notesSlides/notesSlide8.xml><?xml version="1.0" encoding="utf-8"?>
+<p:notes xmlns:a="http://schemas.openxmlformats.org/drawingml/2006/main" xmlns:r="http://schemas.openxmlformats.org/officeDocument/2006/relationships" xmlns:p="http://schemas.openxmlformats.org/presentationml/2006/main">
+  <p:cSld>
+    <p:spTree>
+      <p:nvGrpSpPr>
+        <p:cNvPr id="1" name=""/>
+        <p:cNvGrpSpPr/>
+        <p:nvPr/>
+      </p:nvGrpSpPr>
+      <p:grpSpPr>
+        <a:xfrm>
+          <a:off x="0" y="0"/>
+          <a:ext cx="0" cy="0"/>
+          <a:chOff x="0" y="0"/>
+          <a:chExt cx="0" cy="0"/>
+        </a:xfrm>
+      </p:grpSpPr>
+      <p:sp>
+        <p:nvSpPr>
+          <p:cNvPr id="2" name="Slide Image Placeholder 1"/>
+          <p:cNvSpPr>
+            <a:spLocks noGrp="1" noRot="1" noChangeAspect="1"/>
+          </p:cNvSpPr>
+          <p:nvPr>
+            <p:ph type="sldImg"/>
+          </p:nvPr>
+        </p:nvSpPr>
+        <p:spPr/>
+      </p:sp>
+      <p:sp>
+        <p:nvSpPr>
+          <p:cNvPr id="3" name="Notes Placeholder 2"/>
+          <p:cNvSpPr>
+            <a:spLocks noGrp="1"/>
+          </p:cNvSpPr>
+          <p:nvPr>
+            <p:ph type="body" idx="1"/>
+          </p:nvPr>
+        </p:nvSpPr>
+        <p:spPr/>
+        <p:txBody>
+          <a:bodyPr/>
+          <a:lstStyle/>
+          <a:p>
+            <a:endParaRPr lang="en-US" dirty="0"/>
+          </a:p>
+        </p:txBody>
+      </p:sp>
+      <p:sp>
+        <p:nvSpPr>
+          <p:cNvPr id="4" name="Slide Number Placeholder 3"/>
+          <p:cNvSpPr>
+            <a:spLocks noGrp="1"/>
+          </p:cNvSpPr>
+          <p:nvPr>
+            <p:ph type="sldNum" sz="quarter" idx="10"/>
+          </p:nvPr>
+        </p:nvSpPr>
+        <p:spPr/>
+        <p:txBody>
+          <a:bodyPr/>
+          <a:lstStyle/>
+          <a:p>
+            <a:fld id="{3EBA5BD7-F043-4D1B-AA17-CD412FC534DE}" type="slidenum">
+              <a:rPr lang="en-US" smtClean="0"/>
+              <a:t>12</a:t>
             </a:fld>
             <a:endParaRPr lang="en-US"/>
           </a:p>
@@ -2011,7 +2096,7 @@
           <a:p>
             <a:fld id="{F0DFD029-FB74-4578-B929-F66AA97659CA}" type="datetimeFigureOut">
               <a:rPr lang="en-US"/>
-              <a:t>2/9/2016</a:t>
+              <a:t>2/10/2016</a:t>
             </a:fld>
             <a:endParaRPr/>
           </a:p>
@@ -2209,7 +2294,7 @@
           <a:p>
             <a:fld id="{F0DFD029-FB74-4578-B929-F66AA97659CA}" type="datetimeFigureOut">
               <a:rPr lang="en-US"/>
-              <a:t>2/9/2016</a:t>
+              <a:t>2/10/2016</a:t>
             </a:fld>
             <a:endParaRPr/>
           </a:p>
@@ -2417,7 +2502,7 @@
           <a:p>
             <a:fld id="{F0DFD029-FB74-4578-B929-F66AA97659CA}" type="datetimeFigureOut">
               <a:rPr lang="en-US"/>
-              <a:t>2/9/2016</a:t>
+              <a:t>2/10/2016</a:t>
             </a:fld>
             <a:endParaRPr/>
           </a:p>
@@ -2615,7 +2700,7 @@
           <a:p>
             <a:fld id="{F0DFD029-FB74-4578-B929-F66AA97659CA}" type="datetimeFigureOut">
               <a:rPr lang="en-US"/>
-              <a:t>2/9/2016</a:t>
+              <a:t>2/10/2016</a:t>
             </a:fld>
             <a:endParaRPr/>
           </a:p>
@@ -2878,7 +2963,7 @@
           <a:p>
             <a:fld id="{F0DFD029-FB74-4578-B929-F66AA97659CA}" type="datetimeFigureOut">
               <a:rPr lang="en-US"/>
-              <a:t>2/9/2016</a:t>
+              <a:t>2/10/2016</a:t>
             </a:fld>
             <a:endParaRPr/>
           </a:p>
@@ -3351,7 +3436,7 @@
           <a:p>
             <a:fld id="{F0DFD029-FB74-4578-B929-F66AA97659CA}" type="datetimeFigureOut">
               <a:rPr lang="en-US"/>
-              <a:t>2/9/2016</a:t>
+              <a:t>2/10/2016</a:t>
             </a:fld>
             <a:endParaRPr/>
           </a:p>
@@ -3807,7 +3892,7 @@
           <a:p>
             <a:fld id="{F0DFD029-FB74-4578-B929-F66AA97659CA}" type="datetimeFigureOut">
               <a:rPr lang="en-US"/>
-              <a:t>2/9/2016</a:t>
+              <a:t>2/10/2016</a:t>
             </a:fld>
             <a:endParaRPr/>
           </a:p>
@@ -3937,7 +4022,7 @@
           <a:p>
             <a:fld id="{F0DFD029-FB74-4578-B929-F66AA97659CA}" type="datetimeFigureOut">
               <a:rPr lang="en-US"/>
-              <a:t>2/9/2016</a:t>
+              <a:t>2/10/2016</a:t>
             </a:fld>
             <a:endParaRPr/>
           </a:p>
@@ -4044,7 +4129,7 @@
           <a:p>
             <a:fld id="{F0DFD029-FB74-4578-B929-F66AA97659CA}" type="datetimeFigureOut">
               <a:rPr lang="en-US"/>
-              <a:t>2/9/2016</a:t>
+              <a:t>2/10/2016</a:t>
             </a:fld>
             <a:endParaRPr/>
           </a:p>
@@ -4343,7 +4428,7 @@
           <a:p>
             <a:fld id="{F0DFD029-FB74-4578-B929-F66AA97659CA}" type="datetimeFigureOut">
               <a:rPr lang="en-US"/>
-              <a:t>2/9/2016</a:t>
+              <a:t>2/10/2016</a:t>
             </a:fld>
             <a:endParaRPr/>
           </a:p>
@@ -4631,7 +4716,7 @@
           <a:p>
             <a:fld id="{F0DFD029-FB74-4578-B929-F66AA97659CA}" type="datetimeFigureOut">
               <a:rPr lang="en-US"/>
-              <a:t>2/9/2016</a:t>
+              <a:t>2/10/2016</a:t>
             </a:fld>
             <a:endParaRPr/>
           </a:p>
@@ -5254,7 +5339,7 @@
             <a:fld id="{F0DFD029-FB74-4578-B929-F66AA97659CA}" type="datetimeFigureOut">
               <a:rPr lang="en-US"/>
               <a:pPr/>
-              <a:t>2/9/2016</a:t>
+              <a:t>2/10/2016</a:t>
             </a:fld>
             <a:endParaRPr/>
           </a:p>
@@ -6103,17 +6188,6 @@
               </a:rPr>
               <a:t>Fumito Nishi</a:t>
             </a:r>
-            <a:endParaRPr lang="en-US" sz="2800" dirty="0" smtClean="0">
-              <a:solidFill>
-                <a:schemeClr val="bg1">
-                  <a:lumMod val="65000"/>
-                  <a:lumOff val="35000"/>
-                </a:schemeClr>
-              </a:solidFill>
-              <a:latin typeface="CMU Sans Serif" panose="02000603000000000000" pitchFamily="50" charset="0"/>
-              <a:ea typeface="CMU Sans Serif" panose="02000603000000000000" pitchFamily="50" charset="0"/>
-              <a:cs typeface="CMU Sans Serif" panose="02000603000000000000" pitchFamily="50" charset="0"/>
-            </a:endParaRPr>
           </a:p>
           <a:p>
             <a:r>
@@ -6837,7 +6911,7 @@
         </p:nvSpPr>
         <p:spPr>
           <a:xfrm>
-            <a:off x="229711" y="2895600"/>
+            <a:off x="1218883" y="274637"/>
             <a:ext cx="10360501" cy="1223963"/>
           </a:xfrm>
         </p:spPr>
@@ -6847,7 +6921,6 @@
           </a:bodyPr>
           <a:lstStyle/>
           <a:p>
-            <a:pPr algn="ctr"/>
             <a:r>
               <a:rPr lang="en-US" sz="5400" dirty="0" smtClean="0">
                 <a:solidFill>
@@ -6860,7 +6933,21 @@
                 <a:ea typeface="CMU Sans Serif Demi Condensed" panose="02000706000000000000" pitchFamily="50" charset="0"/>
                 <a:cs typeface="CMU Sans Serif Demi Condensed" panose="02000706000000000000" pitchFamily="50" charset="0"/>
               </a:rPr>
-              <a:t>THANK YOU FOR LISTENING</a:t>
+              <a:t>DESIGN DETAIL </a:t>
+            </a:r>
+            <a:r>
+              <a:rPr lang="en-US" dirty="0" smtClean="0">
+                <a:solidFill>
+                  <a:schemeClr val="bg1">
+                    <a:lumMod val="65000"/>
+                    <a:lumOff val="35000"/>
+                  </a:schemeClr>
+                </a:solidFill>
+                <a:latin typeface="CMU Sans Serif Demi Condensed" panose="02000706000000000000" pitchFamily="50" charset="0"/>
+                <a:ea typeface="CMU Sans Serif Demi Condensed" panose="02000706000000000000" pitchFamily="50" charset="0"/>
+                <a:cs typeface="CMU Sans Serif Demi Condensed" panose="02000706000000000000" pitchFamily="50" charset="0"/>
+              </a:rPr>
+              <a:t>\ Arduino: Digital ball</a:t>
             </a:r>
             <a:endParaRPr lang="en-US" sz="5400" dirty="0">
               <a:solidFill>
@@ -6872,6 +6959,50 @@
               <a:latin typeface="CMU Sans Serif Demi Condensed" panose="02000706000000000000" pitchFamily="50" charset="0"/>
               <a:ea typeface="CMU Sans Serif Demi Condensed" panose="02000706000000000000" pitchFamily="50" charset="0"/>
               <a:cs typeface="CMU Sans Serif Demi Condensed" panose="02000706000000000000" pitchFamily="50" charset="0"/>
+            </a:endParaRPr>
+          </a:p>
+        </p:txBody>
+      </p:sp>
+      <p:sp>
+        <p:nvSpPr>
+          <p:cNvPr id="32" name="TextBox 31"/>
+          <p:cNvSpPr txBox="1"/>
+          <p:nvPr/>
+        </p:nvSpPr>
+        <p:spPr>
+          <a:xfrm>
+            <a:off x="1370012" y="1600200"/>
+            <a:ext cx="4831772" cy="523220"/>
+          </a:xfrm>
+          <a:prstGeom prst="rect">
+            <a:avLst/>
+          </a:prstGeom>
+          <a:noFill/>
+        </p:spPr>
+        <p:txBody>
+          <a:bodyPr wrap="none" rtlCol="0">
+            <a:spAutoFit/>
+          </a:bodyPr>
+          <a:lstStyle/>
+          <a:p>
+            <a:r>
+              <a:rPr lang="en-US" sz="2800" dirty="0" smtClean="0">
+                <a:solidFill>
+                  <a:schemeClr val="accent1"/>
+                </a:solidFill>
+                <a:latin typeface="CMU Bright" panose="02000603000000000000" pitchFamily="50" charset="0"/>
+                <a:ea typeface="CMU Bright" panose="02000603000000000000" pitchFamily="50" charset="0"/>
+                <a:cs typeface="CMU Bright" panose="02000603000000000000" pitchFamily="50" charset="0"/>
+              </a:rPr>
+              <a:t>State-based motion detection:</a:t>
+            </a:r>
+            <a:endParaRPr lang="en-US" sz="2800" dirty="0">
+              <a:solidFill>
+                <a:schemeClr val="accent1"/>
+              </a:solidFill>
+              <a:latin typeface="CMU Bright" panose="02000603000000000000" pitchFamily="50" charset="0"/>
+              <a:ea typeface="CMU Bright" panose="02000603000000000000" pitchFamily="50" charset="0"/>
+              <a:cs typeface="CMU Bright" panose="02000603000000000000" pitchFamily="50" charset="0"/>
             </a:endParaRPr>
           </a:p>
         </p:txBody>
@@ -6947,6 +7078,7 @@
               <a:rPr lang="en-US" sz="2800" dirty="0" smtClean="0"/>
               <a:t>10</a:t>
             </a:r>
+            <a:endParaRPr lang="en-US" sz="2800" dirty="0" smtClean="0"/>
           </a:p>
         </p:txBody>
       </p:sp>
@@ -6958,7 +7090,1335 @@
         </p:nvSpPr>
         <p:spPr>
           <a:xfrm>
-            <a:off x="942892" y="2895600"/>
+            <a:off x="8649566" y="1387445"/>
+            <a:ext cx="1788246" cy="400110"/>
+          </a:xfrm>
+          <a:prstGeom prst="rect">
+            <a:avLst/>
+          </a:prstGeom>
+          <a:noFill/>
+        </p:spPr>
+        <p:txBody>
+          <a:bodyPr wrap="none" rtlCol="0">
+            <a:spAutoFit/>
+          </a:bodyPr>
+          <a:lstStyle/>
+          <a:p>
+            <a:r>
+              <a:rPr lang="en-US" sz="2000" dirty="0" smtClean="0">
+                <a:solidFill>
+                  <a:schemeClr val="accent1"/>
+                </a:solidFill>
+                <a:latin typeface="CMU Bright" panose="02000603000000000000" pitchFamily="50" charset="0"/>
+                <a:ea typeface="CMU Bright" panose="02000603000000000000" pitchFamily="50" charset="0"/>
+                <a:cs typeface="CMU Bright" panose="02000603000000000000" pitchFamily="50" charset="0"/>
+              </a:rPr>
+              <a:t>Hoang Nguyen</a:t>
+            </a:r>
+            <a:endParaRPr lang="en-US" sz="2000" dirty="0">
+              <a:solidFill>
+                <a:schemeClr val="accent1"/>
+              </a:solidFill>
+              <a:latin typeface="CMU Bright" panose="02000603000000000000" pitchFamily="50" charset="0"/>
+              <a:ea typeface="CMU Bright" panose="02000603000000000000" pitchFamily="50" charset="0"/>
+              <a:cs typeface="CMU Bright" panose="02000603000000000000" pitchFamily="50" charset="0"/>
+            </a:endParaRPr>
+          </a:p>
+        </p:txBody>
+      </p:sp>
+      <p:sp>
+        <p:nvSpPr>
+          <p:cNvPr id="4" name="Oval 3"/>
+          <p:cNvSpPr/>
+          <p:nvPr/>
+        </p:nvSpPr>
+        <p:spPr>
+          <a:xfrm>
+            <a:off x="3427491" y="3276600"/>
+            <a:ext cx="838200" cy="838200"/>
+          </a:xfrm>
+          <a:prstGeom prst="ellipse">
+            <a:avLst/>
+          </a:prstGeom>
+        </p:spPr>
+        <p:style>
+          <a:lnRef idx="2">
+            <a:schemeClr val="accent1">
+              <a:shade val="50000"/>
+            </a:schemeClr>
+          </a:lnRef>
+          <a:fillRef idx="1">
+            <a:schemeClr val="accent1"/>
+          </a:fillRef>
+          <a:effectRef idx="0">
+            <a:schemeClr val="accent1"/>
+          </a:effectRef>
+          <a:fontRef idx="minor">
+            <a:schemeClr val="lt1"/>
+          </a:fontRef>
+        </p:style>
+        <p:txBody>
+          <a:bodyPr rtlCol="0" anchor="ctr"/>
+          <a:lstStyle/>
+          <a:p>
+            <a:pPr algn="ctr"/>
+            <a:r>
+              <a:rPr lang="en-US" sz="2800" dirty="0" smtClean="0"/>
+              <a:t>E</a:t>
+            </a:r>
+            <a:endParaRPr lang="en-US" sz="2800" dirty="0"/>
+          </a:p>
+        </p:txBody>
+      </p:sp>
+      <p:sp>
+        <p:nvSpPr>
+          <p:cNvPr id="13" name="Oval 12"/>
+          <p:cNvSpPr/>
+          <p:nvPr/>
+        </p:nvSpPr>
+        <p:spPr>
+          <a:xfrm>
+            <a:off x="8456612" y="3096746"/>
+            <a:ext cx="838200" cy="838200"/>
+          </a:xfrm>
+          <a:prstGeom prst="ellipse">
+            <a:avLst/>
+          </a:prstGeom>
+        </p:spPr>
+        <p:style>
+          <a:lnRef idx="2">
+            <a:schemeClr val="accent1">
+              <a:shade val="50000"/>
+            </a:schemeClr>
+          </a:lnRef>
+          <a:fillRef idx="1">
+            <a:schemeClr val="accent1"/>
+          </a:fillRef>
+          <a:effectRef idx="0">
+            <a:schemeClr val="accent1"/>
+          </a:effectRef>
+          <a:fontRef idx="minor">
+            <a:schemeClr val="lt1"/>
+          </a:fontRef>
+        </p:style>
+        <p:txBody>
+          <a:bodyPr rtlCol="0" anchor="ctr"/>
+          <a:lstStyle/>
+          <a:p>
+            <a:pPr algn="ctr"/>
+            <a:r>
+              <a:rPr lang="en-US" sz="2800" dirty="0" smtClean="0"/>
+              <a:t>C</a:t>
+            </a:r>
+            <a:endParaRPr lang="en-US" sz="2800" dirty="0"/>
+          </a:p>
+        </p:txBody>
+      </p:sp>
+      <p:sp>
+        <p:nvSpPr>
+          <p:cNvPr id="14" name="Oval 13"/>
+          <p:cNvSpPr/>
+          <p:nvPr/>
+        </p:nvSpPr>
+        <p:spPr>
+          <a:xfrm>
+            <a:off x="5370551" y="3276600"/>
+            <a:ext cx="838200" cy="838200"/>
+          </a:xfrm>
+          <a:prstGeom prst="ellipse">
+            <a:avLst/>
+          </a:prstGeom>
+        </p:spPr>
+        <p:style>
+          <a:lnRef idx="2">
+            <a:schemeClr val="accent1">
+              <a:shade val="50000"/>
+            </a:schemeClr>
+          </a:lnRef>
+          <a:fillRef idx="1">
+            <a:schemeClr val="accent1"/>
+          </a:fillRef>
+          <a:effectRef idx="0">
+            <a:schemeClr val="accent1"/>
+          </a:effectRef>
+          <a:fontRef idx="minor">
+            <a:schemeClr val="lt1"/>
+          </a:fontRef>
+        </p:style>
+        <p:txBody>
+          <a:bodyPr rtlCol="0" anchor="ctr"/>
+          <a:lstStyle/>
+          <a:p>
+            <a:pPr algn="ctr"/>
+            <a:r>
+              <a:rPr lang="en-US" sz="2800" dirty="0" smtClean="0"/>
+              <a:t>F</a:t>
+            </a:r>
+            <a:endParaRPr lang="en-US" sz="2800" dirty="0"/>
+          </a:p>
+        </p:txBody>
+      </p:sp>
+      <p:sp>
+        <p:nvSpPr>
+          <p:cNvPr id="15" name="Oval 14"/>
+          <p:cNvSpPr/>
+          <p:nvPr/>
+        </p:nvSpPr>
+        <p:spPr>
+          <a:xfrm>
+            <a:off x="5922981" y="4648200"/>
+            <a:ext cx="838200" cy="838200"/>
+          </a:xfrm>
+          <a:prstGeom prst="ellipse">
+            <a:avLst/>
+          </a:prstGeom>
+        </p:spPr>
+        <p:style>
+          <a:lnRef idx="2">
+            <a:schemeClr val="accent1">
+              <a:shade val="50000"/>
+            </a:schemeClr>
+          </a:lnRef>
+          <a:fillRef idx="1">
+            <a:schemeClr val="accent1"/>
+          </a:fillRef>
+          <a:effectRef idx="0">
+            <a:schemeClr val="accent1"/>
+          </a:effectRef>
+          <a:fontRef idx="minor">
+            <a:schemeClr val="lt1"/>
+          </a:fontRef>
+        </p:style>
+        <p:txBody>
+          <a:bodyPr rtlCol="0" anchor="ctr"/>
+          <a:lstStyle/>
+          <a:p>
+            <a:pPr algn="ctr"/>
+            <a:r>
+              <a:rPr lang="en-US" sz="2800" dirty="0" smtClean="0"/>
+              <a:t>T</a:t>
+            </a:r>
+            <a:endParaRPr lang="en-US" sz="2800" dirty="0"/>
+          </a:p>
+        </p:txBody>
+      </p:sp>
+      <p:sp>
+        <p:nvSpPr>
+          <p:cNvPr id="16" name="Oval 15"/>
+          <p:cNvSpPr/>
+          <p:nvPr/>
+        </p:nvSpPr>
+        <p:spPr>
+          <a:xfrm>
+            <a:off x="3963917" y="5440362"/>
+            <a:ext cx="838200" cy="838200"/>
+          </a:xfrm>
+          <a:prstGeom prst="ellipse">
+            <a:avLst/>
+          </a:prstGeom>
+        </p:spPr>
+        <p:style>
+          <a:lnRef idx="2">
+            <a:schemeClr val="accent1">
+              <a:shade val="50000"/>
+            </a:schemeClr>
+          </a:lnRef>
+          <a:fillRef idx="1">
+            <a:schemeClr val="accent1"/>
+          </a:fillRef>
+          <a:effectRef idx="0">
+            <a:schemeClr val="accent1"/>
+          </a:effectRef>
+          <a:fontRef idx="minor">
+            <a:schemeClr val="lt1"/>
+          </a:fontRef>
+        </p:style>
+        <p:txBody>
+          <a:bodyPr rtlCol="0" anchor="ctr"/>
+          <a:lstStyle/>
+          <a:p>
+            <a:pPr algn="ctr"/>
+            <a:r>
+              <a:rPr lang="en-US" sz="2800" dirty="0" smtClean="0"/>
+              <a:t>DT</a:t>
+            </a:r>
+            <a:endParaRPr lang="en-US" sz="2800" dirty="0"/>
+          </a:p>
+        </p:txBody>
+      </p:sp>
+      <p:cxnSp>
+        <p:nvCxnSpPr>
+          <p:cNvPr id="11" name="Straight Arrow Connector 10"/>
+          <p:cNvCxnSpPr>
+            <a:stCxn id="14" idx="6"/>
+            <a:endCxn id="13" idx="2"/>
+          </p:cNvCxnSpPr>
+          <p:nvPr/>
+        </p:nvCxnSpPr>
+        <p:spPr>
+          <a:xfrm flipV="1">
+            <a:off x="6208751" y="3515846"/>
+            <a:ext cx="2247861" cy="179854"/>
+          </a:xfrm>
+          <a:prstGeom prst="straightConnector1">
+            <a:avLst/>
+          </a:prstGeom>
+          <a:ln w="25400">
+            <a:tailEnd type="triangle"/>
+          </a:ln>
+        </p:spPr>
+        <p:style>
+          <a:lnRef idx="1">
+            <a:schemeClr val="accent1"/>
+          </a:lnRef>
+          <a:fillRef idx="0">
+            <a:schemeClr val="accent1"/>
+          </a:fillRef>
+          <a:effectRef idx="0">
+            <a:schemeClr val="accent1"/>
+          </a:effectRef>
+          <a:fontRef idx="minor">
+            <a:schemeClr val="tx1"/>
+          </a:fontRef>
+        </p:style>
+      </p:cxnSp>
+      <p:cxnSp>
+        <p:nvCxnSpPr>
+          <p:cNvPr id="21" name="Curved Connector 20"/>
+          <p:cNvCxnSpPr>
+            <a:stCxn id="13" idx="0"/>
+            <a:endCxn id="4" idx="0"/>
+          </p:cNvCxnSpPr>
+          <p:nvPr/>
+        </p:nvCxnSpPr>
+        <p:spPr>
+          <a:xfrm rot="16200000" flipH="1" flipV="1">
+            <a:off x="6271225" y="672112"/>
+            <a:ext cx="179854" cy="5029121"/>
+          </a:xfrm>
+          <a:prstGeom prst="curvedConnector3">
+            <a:avLst>
+              <a:gd name="adj1" fmla="val -127103"/>
+            </a:avLst>
+          </a:prstGeom>
+          <a:ln w="25400">
+            <a:tailEnd type="triangle"/>
+          </a:ln>
+        </p:spPr>
+        <p:style>
+          <a:lnRef idx="1">
+            <a:schemeClr val="accent1"/>
+          </a:lnRef>
+          <a:fillRef idx="0">
+            <a:schemeClr val="accent1"/>
+          </a:fillRef>
+          <a:effectRef idx="0">
+            <a:schemeClr val="accent1"/>
+          </a:effectRef>
+          <a:fontRef idx="minor">
+            <a:schemeClr val="tx1"/>
+          </a:fontRef>
+        </p:style>
+      </p:cxnSp>
+      <p:cxnSp>
+        <p:nvCxnSpPr>
+          <p:cNvPr id="24" name="Curved Connector 23"/>
+          <p:cNvCxnSpPr>
+            <a:stCxn id="4" idx="6"/>
+            <a:endCxn id="14" idx="2"/>
+          </p:cNvCxnSpPr>
+          <p:nvPr/>
+        </p:nvCxnSpPr>
+        <p:spPr>
+          <a:xfrm>
+            <a:off x="4265691" y="3695700"/>
+            <a:ext cx="1104860" cy="12700"/>
+          </a:xfrm>
+          <a:prstGeom prst="curvedConnector3">
+            <a:avLst>
+              <a:gd name="adj1" fmla="val 50000"/>
+            </a:avLst>
+          </a:prstGeom>
+          <a:ln w="25400">
+            <a:tailEnd type="triangle"/>
+          </a:ln>
+        </p:spPr>
+        <p:style>
+          <a:lnRef idx="1">
+            <a:schemeClr val="accent1"/>
+          </a:lnRef>
+          <a:fillRef idx="0">
+            <a:schemeClr val="accent1"/>
+          </a:fillRef>
+          <a:effectRef idx="0">
+            <a:schemeClr val="accent1"/>
+          </a:effectRef>
+          <a:fontRef idx="minor">
+            <a:schemeClr val="tx1"/>
+          </a:fontRef>
+        </p:style>
+      </p:cxnSp>
+      <p:cxnSp>
+        <p:nvCxnSpPr>
+          <p:cNvPr id="55" name="Curved Connector 54"/>
+          <p:cNvCxnSpPr>
+            <a:stCxn id="15" idx="6"/>
+            <a:endCxn id="14" idx="5"/>
+          </p:cNvCxnSpPr>
+          <p:nvPr/>
+        </p:nvCxnSpPr>
+        <p:spPr>
+          <a:xfrm flipH="1" flipV="1">
+            <a:off x="6085999" y="3992048"/>
+            <a:ext cx="675182" cy="1075252"/>
+          </a:xfrm>
+          <a:prstGeom prst="curvedConnector4">
+            <a:avLst>
+              <a:gd name="adj1" fmla="val -33858"/>
+              <a:gd name="adj2" fmla="val 63780"/>
+            </a:avLst>
+          </a:prstGeom>
+          <a:ln w="25400">
+            <a:tailEnd type="triangle"/>
+          </a:ln>
+        </p:spPr>
+        <p:style>
+          <a:lnRef idx="1">
+            <a:schemeClr val="accent1"/>
+          </a:lnRef>
+          <a:fillRef idx="0">
+            <a:schemeClr val="accent1"/>
+          </a:fillRef>
+          <a:effectRef idx="0">
+            <a:schemeClr val="accent1"/>
+          </a:effectRef>
+          <a:fontRef idx="minor">
+            <a:schemeClr val="tx1"/>
+          </a:fontRef>
+        </p:style>
+      </p:cxnSp>
+      <p:cxnSp>
+        <p:nvCxnSpPr>
+          <p:cNvPr id="64" name="Curved Connector 63"/>
+          <p:cNvCxnSpPr>
+            <a:stCxn id="4" idx="4"/>
+            <a:endCxn id="15" idx="2"/>
+          </p:cNvCxnSpPr>
+          <p:nvPr/>
+        </p:nvCxnSpPr>
+        <p:spPr>
+          <a:xfrm rot="16200000" flipH="1">
+            <a:off x="4408536" y="3552855"/>
+            <a:ext cx="952500" cy="2076390"/>
+          </a:xfrm>
+          <a:prstGeom prst="curvedConnector2">
+            <a:avLst/>
+          </a:prstGeom>
+          <a:ln w="25400">
+            <a:tailEnd type="triangle"/>
+          </a:ln>
+        </p:spPr>
+        <p:style>
+          <a:lnRef idx="1">
+            <a:schemeClr val="accent1"/>
+          </a:lnRef>
+          <a:fillRef idx="0">
+            <a:schemeClr val="accent1"/>
+          </a:fillRef>
+          <a:effectRef idx="0">
+            <a:schemeClr val="accent1"/>
+          </a:effectRef>
+          <a:fontRef idx="minor">
+            <a:schemeClr val="tx1"/>
+          </a:fontRef>
+        </p:style>
+      </p:cxnSp>
+      <p:cxnSp>
+        <p:nvCxnSpPr>
+          <p:cNvPr id="69" name="Curved Connector 68"/>
+          <p:cNvCxnSpPr>
+            <a:stCxn id="15" idx="3"/>
+            <a:endCxn id="16" idx="6"/>
+          </p:cNvCxnSpPr>
+          <p:nvPr/>
+        </p:nvCxnSpPr>
+        <p:spPr>
+          <a:xfrm rot="5400000">
+            <a:off x="5176018" y="4989747"/>
+            <a:ext cx="495814" cy="1243616"/>
+          </a:xfrm>
+          <a:prstGeom prst="curvedConnector2">
+            <a:avLst/>
+          </a:prstGeom>
+          <a:ln w="25400">
+            <a:tailEnd type="triangle"/>
+          </a:ln>
+        </p:spPr>
+        <p:style>
+          <a:lnRef idx="1">
+            <a:schemeClr val="accent1"/>
+          </a:lnRef>
+          <a:fillRef idx="0">
+            <a:schemeClr val="accent1"/>
+          </a:fillRef>
+          <a:effectRef idx="0">
+            <a:schemeClr val="accent1"/>
+          </a:effectRef>
+          <a:fontRef idx="minor">
+            <a:schemeClr val="tx1"/>
+          </a:fontRef>
+        </p:style>
+      </p:cxnSp>
+      <p:cxnSp>
+        <p:nvCxnSpPr>
+          <p:cNvPr id="71" name="Curved Connector 70"/>
+          <p:cNvCxnSpPr>
+            <a:stCxn id="16" idx="2"/>
+            <a:endCxn id="4" idx="3"/>
+          </p:cNvCxnSpPr>
+          <p:nvPr/>
+        </p:nvCxnSpPr>
+        <p:spPr>
+          <a:xfrm rot="10800000">
+            <a:off x="3550243" y="3992048"/>
+            <a:ext cx="413674" cy="1867414"/>
+          </a:xfrm>
+          <a:prstGeom prst="curvedConnector2">
+            <a:avLst/>
+          </a:prstGeom>
+          <a:ln w="25400">
+            <a:tailEnd type="triangle"/>
+          </a:ln>
+        </p:spPr>
+        <p:style>
+          <a:lnRef idx="1">
+            <a:schemeClr val="accent1"/>
+          </a:lnRef>
+          <a:fillRef idx="0">
+            <a:schemeClr val="accent1"/>
+          </a:fillRef>
+          <a:effectRef idx="0">
+            <a:schemeClr val="accent1"/>
+          </a:effectRef>
+          <a:fontRef idx="minor">
+            <a:schemeClr val="tx1"/>
+          </a:fontRef>
+        </p:style>
+      </p:cxnSp>
+      <p:cxnSp>
+        <p:nvCxnSpPr>
+          <p:cNvPr id="79" name="Curved Connector 78"/>
+          <p:cNvCxnSpPr>
+            <a:stCxn id="15" idx="1"/>
+            <a:endCxn id="4" idx="5"/>
+          </p:cNvCxnSpPr>
+          <p:nvPr/>
+        </p:nvCxnSpPr>
+        <p:spPr>
+          <a:xfrm rot="16200000" flipV="1">
+            <a:off x="4704884" y="3430103"/>
+            <a:ext cx="778904" cy="1902794"/>
+          </a:xfrm>
+          <a:prstGeom prst="curvedConnector3">
+            <a:avLst>
+              <a:gd name="adj1" fmla="val 24617"/>
+            </a:avLst>
+          </a:prstGeom>
+          <a:ln w="25400">
+            <a:tailEnd type="triangle"/>
+          </a:ln>
+        </p:spPr>
+        <p:style>
+          <a:lnRef idx="1">
+            <a:schemeClr val="accent1"/>
+          </a:lnRef>
+          <a:fillRef idx="0">
+            <a:schemeClr val="accent1"/>
+          </a:fillRef>
+          <a:effectRef idx="0">
+            <a:schemeClr val="accent1"/>
+          </a:effectRef>
+          <a:fontRef idx="minor">
+            <a:schemeClr val="tx1"/>
+          </a:fontRef>
+        </p:style>
+      </p:cxnSp>
+      <p:sp>
+        <p:nvSpPr>
+          <p:cNvPr id="81" name="TextBox 80"/>
+          <p:cNvSpPr txBox="1"/>
+          <p:nvPr/>
+        </p:nvSpPr>
+        <p:spPr>
+          <a:xfrm>
+            <a:off x="5479937" y="2575286"/>
+            <a:ext cx="565796" cy="307777"/>
+          </a:xfrm>
+          <a:prstGeom prst="rect">
+            <a:avLst/>
+          </a:prstGeom>
+          <a:noFill/>
+        </p:spPr>
+        <p:txBody>
+          <a:bodyPr wrap="none" rtlCol="0">
+            <a:spAutoFit/>
+          </a:bodyPr>
+          <a:lstStyle/>
+          <a:p>
+            <a:r>
+              <a:rPr lang="en-US" sz="1400" dirty="0" smtClean="0">
+                <a:solidFill>
+                  <a:schemeClr val="bg1">
+                    <a:lumMod val="65000"/>
+                    <a:lumOff val="35000"/>
+                  </a:schemeClr>
+                </a:solidFill>
+                <a:latin typeface="CMU Bright" panose="02000603000000000000" pitchFamily="50" charset="0"/>
+                <a:ea typeface="CMU Bright" panose="02000603000000000000" pitchFamily="50" charset="0"/>
+                <a:cs typeface="CMU Bright" panose="02000603000000000000" pitchFamily="50" charset="0"/>
+              </a:rPr>
+              <a:t>delay</a:t>
+            </a:r>
+            <a:endParaRPr lang="en-US" sz="1400" dirty="0">
+              <a:solidFill>
+                <a:schemeClr val="bg1">
+                  <a:lumMod val="65000"/>
+                  <a:lumOff val="35000"/>
+                </a:schemeClr>
+              </a:solidFill>
+              <a:latin typeface="CMU Bright" panose="02000603000000000000" pitchFamily="50" charset="0"/>
+              <a:ea typeface="CMU Bright" panose="02000603000000000000" pitchFamily="50" charset="0"/>
+              <a:cs typeface="CMU Bright" panose="02000603000000000000" pitchFamily="50" charset="0"/>
+            </a:endParaRPr>
+          </a:p>
+        </p:txBody>
+      </p:sp>
+      <mc:AlternateContent xmlns:mc="http://schemas.openxmlformats.org/markup-compatibility/2006">
+        <mc:Choice xmlns:a14="http://schemas.microsoft.com/office/drawing/2010/main" Requires="a14">
+          <p:sp>
+            <p:nvSpPr>
+              <p:cNvPr id="82" name="TextBox 81"/>
+              <p:cNvSpPr txBox="1"/>
+              <p:nvPr/>
+            </p:nvSpPr>
+            <p:spPr>
+              <a:xfrm>
+                <a:off x="4373303" y="3425051"/>
+                <a:ext cx="923138" cy="276999"/>
+              </a:xfrm>
+              <a:prstGeom prst="rect">
+                <a:avLst/>
+              </a:prstGeom>
+              <a:noFill/>
+            </p:spPr>
+            <p:txBody>
+              <a:bodyPr wrap="none" rtlCol="0">
+                <a:spAutoFit/>
+              </a:bodyPr>
+              <a:lstStyle/>
+              <a:p>
+                <a:r>
+                  <a:rPr lang="en-US" sz="1200" dirty="0" smtClean="0">
+                    <a:solidFill>
+                      <a:schemeClr val="bg1">
+                        <a:lumMod val="65000"/>
+                        <a:lumOff val="35000"/>
+                      </a:schemeClr>
+                    </a:solidFill>
+                    <a:latin typeface="CMU Bright" panose="02000603000000000000" pitchFamily="50" charset="0"/>
+                    <a:ea typeface="CMU Bright" panose="02000603000000000000" pitchFamily="50" charset="0"/>
+                    <a:cs typeface="CMU Bright" panose="02000603000000000000" pitchFamily="50" charset="0"/>
+                  </a:rPr>
+                  <a:t>g_rms </a:t>
+                </a:r>
+                <a14:m>
+                  <m:oMath xmlns:m="http://schemas.openxmlformats.org/officeDocument/2006/math">
+                    <m:r>
+                      <a:rPr lang="en-US" sz="1200" i="1" smtClean="0">
+                        <a:solidFill>
+                          <a:schemeClr val="bg1">
+                            <a:lumMod val="65000"/>
+                            <a:lumOff val="35000"/>
+                          </a:schemeClr>
+                        </a:solidFill>
+                        <a:latin typeface="Cambria Math" panose="02040503050406030204" pitchFamily="18" charset="0"/>
+                        <a:ea typeface="Cambria Math" panose="02040503050406030204" pitchFamily="18" charset="0"/>
+                        <a:cs typeface="CMU Bright" panose="02000603000000000000" pitchFamily="50" charset="0"/>
+                      </a:rPr>
+                      <m:t>≈</m:t>
+                    </m:r>
+                    <m:r>
+                      <a:rPr lang="en-US" sz="1200" b="0" i="1" smtClean="0">
+                        <a:solidFill>
+                          <a:schemeClr val="bg1">
+                            <a:lumMod val="65000"/>
+                            <a:lumOff val="35000"/>
+                          </a:schemeClr>
+                        </a:solidFill>
+                        <a:latin typeface="Cambria Math" panose="02040503050406030204" pitchFamily="18" charset="0"/>
+                        <a:ea typeface="Cambria Math" panose="02040503050406030204" pitchFamily="18" charset="0"/>
+                        <a:cs typeface="CMU Bright" panose="02000603000000000000" pitchFamily="50" charset="0"/>
+                      </a:rPr>
+                      <m:t>0</m:t>
+                    </m:r>
+                  </m:oMath>
+                </a14:m>
+                <a:endParaRPr lang="en-US" sz="1200" dirty="0">
+                  <a:solidFill>
+                    <a:schemeClr val="bg1">
+                      <a:lumMod val="65000"/>
+                      <a:lumOff val="35000"/>
+                    </a:schemeClr>
+                  </a:solidFill>
+                  <a:latin typeface="CMU Bright" panose="02000603000000000000" pitchFamily="50" charset="0"/>
+                  <a:ea typeface="CMU Bright" panose="02000603000000000000" pitchFamily="50" charset="0"/>
+                  <a:cs typeface="CMU Bright" panose="02000603000000000000" pitchFamily="50" charset="0"/>
+                </a:endParaRPr>
+              </a:p>
+            </p:txBody>
+          </p:sp>
+        </mc:Choice>
+        <mc:Fallback>
+          <p:sp>
+            <p:nvSpPr>
+              <p:cNvPr id="82" name="TextBox 81"/>
+              <p:cNvSpPr txBox="1">
+                <a:spLocks noRot="1" noChangeAspect="1" noMove="1" noResize="1" noEditPoints="1" noAdjustHandles="1" noChangeArrowheads="1" noChangeShapeType="1" noTextEdit="1"/>
+              </p:cNvSpPr>
+              <p:nvPr/>
+            </p:nvSpPr>
+            <p:spPr>
+              <a:xfrm>
+                <a:off x="4373303" y="3425051"/>
+                <a:ext cx="923138" cy="276999"/>
+              </a:xfrm>
+              <a:prstGeom prst="rect">
+                <a:avLst/>
+              </a:prstGeom>
+              <a:blipFill>
+                <a:blip r:embed="rId3"/>
+                <a:stretch>
+                  <a:fillRect t="-2222" b="-17778"/>
+                </a:stretch>
+              </a:blipFill>
+            </p:spPr>
+            <p:txBody>
+              <a:bodyPr/>
+              <a:lstStyle/>
+              <a:p>
+                <a:r>
+                  <a:rPr lang="en-US">
+                    <a:noFill/>
+                  </a:rPr>
+                  <a:t> </a:t>
+                </a:r>
+              </a:p>
+            </p:txBody>
+          </p:sp>
+        </mc:Fallback>
+      </mc:AlternateContent>
+      <p:sp>
+        <p:nvSpPr>
+          <p:cNvPr id="84" name="TextBox 83"/>
+          <p:cNvSpPr txBox="1"/>
+          <p:nvPr/>
+        </p:nvSpPr>
+        <p:spPr>
+          <a:xfrm rot="21334905">
+            <a:off x="6538398" y="3335908"/>
+            <a:ext cx="1550424" cy="276999"/>
+          </a:xfrm>
+          <a:prstGeom prst="rect">
+            <a:avLst/>
+          </a:prstGeom>
+          <a:noFill/>
+        </p:spPr>
+        <p:txBody>
+          <a:bodyPr wrap="none" rtlCol="0">
+            <a:spAutoFit/>
+          </a:bodyPr>
+          <a:lstStyle/>
+          <a:p>
+            <a:r>
+              <a:rPr lang="en-US" sz="1200" dirty="0" smtClean="0">
+                <a:solidFill>
+                  <a:schemeClr val="bg1">
+                    <a:lumMod val="65000"/>
+                    <a:lumOff val="35000"/>
+                  </a:schemeClr>
+                </a:solidFill>
+                <a:latin typeface="CMU Bright" panose="02000603000000000000" pitchFamily="50" charset="0"/>
+                <a:ea typeface="CMU Bright" panose="02000603000000000000" pitchFamily="50" charset="0"/>
+                <a:cs typeface="CMU Bright" panose="02000603000000000000" pitchFamily="50" charset="0"/>
+              </a:rPr>
+              <a:t>g_rms &gt; col_thresh</a:t>
+            </a:r>
+            <a:endParaRPr lang="en-US" sz="1200" dirty="0">
+              <a:solidFill>
+                <a:schemeClr val="bg1">
+                  <a:lumMod val="65000"/>
+                  <a:lumOff val="35000"/>
+                </a:schemeClr>
+              </a:solidFill>
+              <a:latin typeface="CMU Bright" panose="02000603000000000000" pitchFamily="50" charset="0"/>
+              <a:ea typeface="CMU Bright" panose="02000603000000000000" pitchFamily="50" charset="0"/>
+              <a:cs typeface="CMU Bright" panose="02000603000000000000" pitchFamily="50" charset="0"/>
+            </a:endParaRPr>
+          </a:p>
+        </p:txBody>
+      </p:sp>
+      <p:sp>
+        <p:nvSpPr>
+          <p:cNvPr id="85" name="TextBox 84"/>
+          <p:cNvSpPr txBox="1"/>
+          <p:nvPr/>
+        </p:nvSpPr>
+        <p:spPr>
+          <a:xfrm>
+            <a:off x="4663395" y="4286692"/>
+            <a:ext cx="647934" cy="261610"/>
+          </a:xfrm>
+          <a:prstGeom prst="rect">
+            <a:avLst/>
+          </a:prstGeom>
+          <a:noFill/>
+        </p:spPr>
+        <p:txBody>
+          <a:bodyPr wrap="none" rtlCol="0">
+            <a:spAutoFit/>
+          </a:bodyPr>
+          <a:lstStyle/>
+          <a:p>
+            <a:r>
+              <a:rPr lang="en-US" sz="1100" dirty="0" smtClean="0">
+                <a:solidFill>
+                  <a:schemeClr val="bg1">
+                    <a:lumMod val="65000"/>
+                    <a:lumOff val="35000"/>
+                  </a:schemeClr>
+                </a:solidFill>
+                <a:latin typeface="CMU Bright" panose="02000603000000000000" pitchFamily="50" charset="0"/>
+                <a:ea typeface="CMU Bright" panose="02000603000000000000" pitchFamily="50" charset="0"/>
+                <a:cs typeface="CMU Bright" panose="02000603000000000000" pitchFamily="50" charset="0"/>
+              </a:rPr>
+              <a:t>timeout</a:t>
+            </a:r>
+            <a:endParaRPr lang="en-US" sz="1100" dirty="0">
+              <a:solidFill>
+                <a:schemeClr val="bg1">
+                  <a:lumMod val="65000"/>
+                  <a:lumOff val="35000"/>
+                </a:schemeClr>
+              </a:solidFill>
+              <a:latin typeface="CMU Bright" panose="02000603000000000000" pitchFamily="50" charset="0"/>
+              <a:ea typeface="CMU Bright" panose="02000603000000000000" pitchFamily="50" charset="0"/>
+              <a:cs typeface="CMU Bright" panose="02000603000000000000" pitchFamily="50" charset="0"/>
+            </a:endParaRPr>
+          </a:p>
+        </p:txBody>
+      </p:sp>
+      <p:sp>
+        <p:nvSpPr>
+          <p:cNvPr id="86" name="TextBox 85"/>
+          <p:cNvSpPr txBox="1"/>
+          <p:nvPr/>
+        </p:nvSpPr>
+        <p:spPr>
+          <a:xfrm rot="1355722">
+            <a:off x="3907742" y="4883469"/>
+            <a:ext cx="1449436" cy="261610"/>
+          </a:xfrm>
+          <a:prstGeom prst="rect">
+            <a:avLst/>
+          </a:prstGeom>
+          <a:noFill/>
+        </p:spPr>
+        <p:txBody>
+          <a:bodyPr wrap="none" rtlCol="0">
+            <a:spAutoFit/>
+          </a:bodyPr>
+          <a:lstStyle/>
+          <a:p>
+            <a:r>
+              <a:rPr lang="en-US" sz="1050" dirty="0" smtClean="0">
+                <a:solidFill>
+                  <a:schemeClr val="bg1">
+                    <a:lumMod val="65000"/>
+                    <a:lumOff val="35000"/>
+                  </a:schemeClr>
+                </a:solidFill>
+                <a:latin typeface="CMU Bright" panose="02000603000000000000" pitchFamily="50" charset="0"/>
+                <a:ea typeface="CMU Bright" panose="02000603000000000000" pitchFamily="50" charset="0"/>
+                <a:cs typeface="CMU Bright" panose="02000603000000000000" pitchFamily="50" charset="0"/>
+              </a:rPr>
+              <a:t>g_rms &gt; tap_thresh</a:t>
+            </a:r>
+            <a:endParaRPr lang="en-US" sz="1050" dirty="0">
+              <a:solidFill>
+                <a:schemeClr val="bg1">
+                  <a:lumMod val="65000"/>
+                  <a:lumOff val="35000"/>
+                </a:schemeClr>
+              </a:solidFill>
+              <a:latin typeface="CMU Bright" panose="02000603000000000000" pitchFamily="50" charset="0"/>
+              <a:ea typeface="CMU Bright" panose="02000603000000000000" pitchFamily="50" charset="0"/>
+              <a:cs typeface="CMU Bright" panose="02000603000000000000" pitchFamily="50" charset="0"/>
+            </a:endParaRPr>
+          </a:p>
+        </p:txBody>
+      </p:sp>
+      <p:sp>
+        <p:nvSpPr>
+          <p:cNvPr id="87" name="TextBox 86"/>
+          <p:cNvSpPr txBox="1"/>
+          <p:nvPr/>
+        </p:nvSpPr>
+        <p:spPr>
+          <a:xfrm>
+            <a:off x="3060446" y="4832093"/>
+            <a:ext cx="565796" cy="307777"/>
+          </a:xfrm>
+          <a:prstGeom prst="rect">
+            <a:avLst/>
+          </a:prstGeom>
+          <a:noFill/>
+        </p:spPr>
+        <p:txBody>
+          <a:bodyPr wrap="none" rtlCol="0">
+            <a:spAutoFit/>
+          </a:bodyPr>
+          <a:lstStyle/>
+          <a:p>
+            <a:r>
+              <a:rPr lang="en-US" sz="1400" dirty="0" smtClean="0">
+                <a:solidFill>
+                  <a:schemeClr val="bg1">
+                    <a:lumMod val="65000"/>
+                    <a:lumOff val="35000"/>
+                  </a:schemeClr>
+                </a:solidFill>
+                <a:latin typeface="CMU Bright" panose="02000603000000000000" pitchFamily="50" charset="0"/>
+                <a:ea typeface="CMU Bright" panose="02000603000000000000" pitchFamily="50" charset="0"/>
+                <a:cs typeface="CMU Bright" panose="02000603000000000000" pitchFamily="50" charset="0"/>
+              </a:rPr>
+              <a:t>delay</a:t>
+            </a:r>
+            <a:endParaRPr lang="en-US" sz="1400" dirty="0">
+              <a:solidFill>
+                <a:schemeClr val="bg1">
+                  <a:lumMod val="65000"/>
+                  <a:lumOff val="35000"/>
+                </a:schemeClr>
+              </a:solidFill>
+              <a:latin typeface="CMU Bright" panose="02000603000000000000" pitchFamily="50" charset="0"/>
+              <a:ea typeface="CMU Bright" panose="02000603000000000000" pitchFamily="50" charset="0"/>
+              <a:cs typeface="CMU Bright" panose="02000603000000000000" pitchFamily="50" charset="0"/>
+            </a:endParaRPr>
+          </a:p>
+        </p:txBody>
+      </p:sp>
+      <p:sp>
+        <p:nvSpPr>
+          <p:cNvPr id="88" name="TextBox 87"/>
+          <p:cNvSpPr txBox="1"/>
+          <p:nvPr/>
+        </p:nvSpPr>
+        <p:spPr>
+          <a:xfrm>
+            <a:off x="4840008" y="5911719"/>
+            <a:ext cx="1576072" cy="461665"/>
+          </a:xfrm>
+          <a:prstGeom prst="rect">
+            <a:avLst/>
+          </a:prstGeom>
+          <a:noFill/>
+        </p:spPr>
+        <p:txBody>
+          <a:bodyPr wrap="none" rtlCol="0">
+            <a:spAutoFit/>
+          </a:bodyPr>
+          <a:lstStyle/>
+          <a:p>
+            <a:r>
+              <a:rPr lang="en-US" sz="1200" dirty="0" smtClean="0">
+                <a:solidFill>
+                  <a:schemeClr val="bg1">
+                    <a:lumMod val="65000"/>
+                    <a:lumOff val="35000"/>
+                  </a:schemeClr>
+                </a:solidFill>
+                <a:latin typeface="CMU Bright" panose="02000603000000000000" pitchFamily="50" charset="0"/>
+                <a:ea typeface="CMU Bright" panose="02000603000000000000" pitchFamily="50" charset="0"/>
+                <a:cs typeface="CMU Bright" panose="02000603000000000000" pitchFamily="50" charset="0"/>
+              </a:rPr>
+              <a:t>g_rms &gt; tap_thresh</a:t>
+            </a:r>
+          </a:p>
+          <a:p>
+            <a:r>
+              <a:rPr lang="en-US" sz="1200" dirty="0" smtClean="0">
+                <a:solidFill>
+                  <a:schemeClr val="bg1">
+                    <a:lumMod val="65000"/>
+                    <a:lumOff val="35000"/>
+                  </a:schemeClr>
+                </a:solidFill>
+                <a:latin typeface="CMU Bright" panose="02000603000000000000" pitchFamily="50" charset="0"/>
+                <a:ea typeface="CMU Bright" panose="02000603000000000000" pitchFamily="50" charset="0"/>
+                <a:cs typeface="CMU Bright" panose="02000603000000000000" pitchFamily="50" charset="0"/>
+              </a:rPr>
+              <a:t>within time frame</a:t>
+            </a:r>
+            <a:endParaRPr lang="en-US" sz="1200" dirty="0">
+              <a:solidFill>
+                <a:schemeClr val="bg1">
+                  <a:lumMod val="65000"/>
+                  <a:lumOff val="35000"/>
+                </a:schemeClr>
+              </a:solidFill>
+              <a:latin typeface="CMU Bright" panose="02000603000000000000" pitchFamily="50" charset="0"/>
+              <a:ea typeface="CMU Bright" panose="02000603000000000000" pitchFamily="50" charset="0"/>
+              <a:cs typeface="CMU Bright" panose="02000603000000000000" pitchFamily="50" charset="0"/>
+            </a:endParaRPr>
+          </a:p>
+        </p:txBody>
+      </p:sp>
+      <p:cxnSp>
+        <p:nvCxnSpPr>
+          <p:cNvPr id="96" name="Curved Connector 95"/>
+          <p:cNvCxnSpPr>
+            <a:stCxn id="15" idx="4"/>
+            <a:endCxn id="15" idx="5"/>
+          </p:cNvCxnSpPr>
+          <p:nvPr/>
+        </p:nvCxnSpPr>
+        <p:spPr>
+          <a:xfrm rot="5400000" flipH="1" flipV="1">
+            <a:off x="6428879" y="5276850"/>
+            <a:ext cx="122752" cy="296348"/>
+          </a:xfrm>
+          <a:prstGeom prst="curvedConnector3">
+            <a:avLst>
+              <a:gd name="adj1" fmla="val -246627"/>
+            </a:avLst>
+          </a:prstGeom>
+          <a:ln w="25400">
+            <a:tailEnd type="triangle"/>
+          </a:ln>
+        </p:spPr>
+        <p:style>
+          <a:lnRef idx="1">
+            <a:schemeClr val="accent1"/>
+          </a:lnRef>
+          <a:fillRef idx="0">
+            <a:schemeClr val="accent1"/>
+          </a:fillRef>
+          <a:effectRef idx="0">
+            <a:schemeClr val="accent1"/>
+          </a:effectRef>
+          <a:fontRef idx="minor">
+            <a:schemeClr val="tx1"/>
+          </a:fontRef>
+        </p:style>
+      </p:cxnSp>
+      <p:sp>
+        <p:nvSpPr>
+          <p:cNvPr id="98" name="TextBox 97"/>
+          <p:cNvSpPr txBox="1"/>
+          <p:nvPr/>
+        </p:nvSpPr>
+        <p:spPr>
+          <a:xfrm>
+            <a:off x="6598180" y="5592248"/>
+            <a:ext cx="2241319" cy="276999"/>
+          </a:xfrm>
+          <a:prstGeom prst="rect">
+            <a:avLst/>
+          </a:prstGeom>
+          <a:noFill/>
+        </p:spPr>
+        <p:txBody>
+          <a:bodyPr wrap="none" rtlCol="0">
+            <a:spAutoFit/>
+          </a:bodyPr>
+          <a:lstStyle/>
+          <a:p>
+            <a:r>
+              <a:rPr lang="en-US" sz="1200" dirty="0">
+                <a:solidFill>
+                  <a:schemeClr val="bg1">
+                    <a:lumMod val="65000"/>
+                    <a:lumOff val="35000"/>
+                  </a:schemeClr>
+                </a:solidFill>
+                <a:latin typeface="CMU Bright" panose="02000603000000000000" pitchFamily="50" charset="0"/>
+                <a:ea typeface="CMU Bright" panose="02000603000000000000" pitchFamily="50" charset="0"/>
+                <a:cs typeface="CMU Bright" panose="02000603000000000000" pitchFamily="50" charset="0"/>
+              </a:rPr>
+              <a:t>v</a:t>
+            </a:r>
+            <a:r>
+              <a:rPr lang="en-US" sz="1200" dirty="0" smtClean="0">
+                <a:solidFill>
+                  <a:schemeClr val="bg1">
+                    <a:lumMod val="65000"/>
+                    <a:lumOff val="35000"/>
+                  </a:schemeClr>
+                </a:solidFill>
+                <a:latin typeface="CMU Bright" panose="02000603000000000000" pitchFamily="50" charset="0"/>
+                <a:ea typeface="CMU Bright" panose="02000603000000000000" pitchFamily="50" charset="0"/>
+                <a:cs typeface="CMU Bright" panose="02000603000000000000" pitchFamily="50" charset="0"/>
+              </a:rPr>
+              <a:t>alidate few next values (j = 5)</a:t>
+            </a:r>
+            <a:endParaRPr lang="en-US" sz="1200" dirty="0">
+              <a:solidFill>
+                <a:schemeClr val="bg1">
+                  <a:lumMod val="65000"/>
+                  <a:lumOff val="35000"/>
+                </a:schemeClr>
+              </a:solidFill>
+              <a:latin typeface="CMU Bright" panose="02000603000000000000" pitchFamily="50" charset="0"/>
+              <a:ea typeface="CMU Bright" panose="02000603000000000000" pitchFamily="50" charset="0"/>
+              <a:cs typeface="CMU Bright" panose="02000603000000000000" pitchFamily="50" charset="0"/>
+            </a:endParaRPr>
+          </a:p>
+        </p:txBody>
+      </p:sp>
+      <mc:AlternateContent xmlns:mc="http://schemas.openxmlformats.org/markup-compatibility/2006">
+        <mc:Choice xmlns:a14="http://schemas.microsoft.com/office/drawing/2010/main" Requires="a14">
+          <p:sp>
+            <p:nvSpPr>
+              <p:cNvPr id="99" name="TextBox 98"/>
+              <p:cNvSpPr txBox="1"/>
+              <p:nvPr/>
+            </p:nvSpPr>
+            <p:spPr>
+              <a:xfrm>
+                <a:off x="6351146" y="4070421"/>
+                <a:ext cx="923138" cy="276999"/>
+              </a:xfrm>
+              <a:prstGeom prst="rect">
+                <a:avLst/>
+              </a:prstGeom>
+              <a:noFill/>
+            </p:spPr>
+            <p:txBody>
+              <a:bodyPr wrap="none" rtlCol="0">
+                <a:spAutoFit/>
+              </a:bodyPr>
+              <a:lstStyle/>
+              <a:p>
+                <a:r>
+                  <a:rPr lang="en-US" sz="1200" dirty="0" smtClean="0">
+                    <a:solidFill>
+                      <a:schemeClr val="bg1">
+                        <a:lumMod val="65000"/>
+                        <a:lumOff val="35000"/>
+                      </a:schemeClr>
+                    </a:solidFill>
+                    <a:latin typeface="CMU Bright" panose="02000603000000000000" pitchFamily="50" charset="0"/>
+                    <a:ea typeface="CMU Bright" panose="02000603000000000000" pitchFamily="50" charset="0"/>
+                    <a:cs typeface="CMU Bright" panose="02000603000000000000" pitchFamily="50" charset="0"/>
+                  </a:rPr>
+                  <a:t>g_rms </a:t>
+                </a:r>
+                <a14:m>
+                  <m:oMath xmlns:m="http://schemas.openxmlformats.org/officeDocument/2006/math">
+                    <m:r>
+                      <a:rPr lang="en-US" sz="1200" i="1" smtClean="0">
+                        <a:solidFill>
+                          <a:schemeClr val="bg1">
+                            <a:lumMod val="65000"/>
+                            <a:lumOff val="35000"/>
+                          </a:schemeClr>
+                        </a:solidFill>
+                        <a:latin typeface="Cambria Math" panose="02040503050406030204" pitchFamily="18" charset="0"/>
+                        <a:ea typeface="Cambria Math" panose="02040503050406030204" pitchFamily="18" charset="0"/>
+                        <a:cs typeface="CMU Bright" panose="02000603000000000000" pitchFamily="50" charset="0"/>
+                      </a:rPr>
+                      <m:t>≈</m:t>
+                    </m:r>
+                    <m:r>
+                      <a:rPr lang="en-US" sz="1200" b="0" i="1" smtClean="0">
+                        <a:solidFill>
+                          <a:schemeClr val="bg1">
+                            <a:lumMod val="65000"/>
+                            <a:lumOff val="35000"/>
+                          </a:schemeClr>
+                        </a:solidFill>
+                        <a:latin typeface="Cambria Math" panose="02040503050406030204" pitchFamily="18" charset="0"/>
+                        <a:ea typeface="Cambria Math" panose="02040503050406030204" pitchFamily="18" charset="0"/>
+                        <a:cs typeface="CMU Bright" panose="02000603000000000000" pitchFamily="50" charset="0"/>
+                      </a:rPr>
+                      <m:t>0</m:t>
+                    </m:r>
+                  </m:oMath>
+                </a14:m>
+                <a:endParaRPr lang="en-US" sz="1200" dirty="0">
+                  <a:solidFill>
+                    <a:schemeClr val="bg1">
+                      <a:lumMod val="65000"/>
+                      <a:lumOff val="35000"/>
+                    </a:schemeClr>
+                  </a:solidFill>
+                  <a:latin typeface="CMU Bright" panose="02000603000000000000" pitchFamily="50" charset="0"/>
+                  <a:ea typeface="CMU Bright" panose="02000603000000000000" pitchFamily="50" charset="0"/>
+                  <a:cs typeface="CMU Bright" panose="02000603000000000000" pitchFamily="50" charset="0"/>
+                </a:endParaRPr>
+              </a:p>
+            </p:txBody>
+          </p:sp>
+        </mc:Choice>
+        <mc:Fallback>
+          <p:sp>
+            <p:nvSpPr>
+              <p:cNvPr id="99" name="TextBox 98"/>
+              <p:cNvSpPr txBox="1">
+                <a:spLocks noRot="1" noChangeAspect="1" noMove="1" noResize="1" noEditPoints="1" noAdjustHandles="1" noChangeArrowheads="1" noChangeShapeType="1" noTextEdit="1"/>
+              </p:cNvSpPr>
+              <p:nvPr/>
+            </p:nvSpPr>
+            <p:spPr>
+              <a:xfrm>
+                <a:off x="6351146" y="4070421"/>
+                <a:ext cx="923138" cy="276999"/>
+              </a:xfrm>
+              <a:prstGeom prst="rect">
+                <a:avLst/>
+              </a:prstGeom>
+              <a:blipFill>
+                <a:blip r:embed="rId4"/>
+                <a:stretch>
+                  <a:fillRect l="-662" t="-2222" b="-17778"/>
+                </a:stretch>
+              </a:blipFill>
+            </p:spPr>
+            <p:txBody>
+              <a:bodyPr/>
+              <a:lstStyle/>
+              <a:p>
+                <a:r>
+                  <a:rPr lang="en-US">
+                    <a:noFill/>
+                  </a:rPr>
+                  <a:t> </a:t>
+                </a:r>
+              </a:p>
+            </p:txBody>
+          </p:sp>
+        </mc:Fallback>
+      </mc:AlternateContent>
+    </p:spTree>
+    <p:extLst>
+      <p:ext uri="{BB962C8B-B14F-4D97-AF65-F5344CB8AC3E}">
+        <p14:creationId xmlns:p14="http://schemas.microsoft.com/office/powerpoint/2010/main" val="3197242195"/>
+      </p:ext>
+    </p:extLst>
+  </p:cSld>
+  <p:clrMapOvr>
+    <a:masterClrMapping/>
+  </p:clrMapOvr>
+  <mc:AlternateContent xmlns:mc="http://schemas.openxmlformats.org/markup-compatibility/2006" xmlns:p14="http://schemas.microsoft.com/office/powerpoint/2010/main">
+    <mc:Choice Requires="p14">
+      <p:transition spd="med" p14:dur="700">
+        <p:fade/>
+      </p:transition>
+    </mc:Choice>
+    <mc:Fallback xmlns="">
+      <p:transition spd="med">
+        <p:fade/>
+      </p:transition>
+    </mc:Fallback>
+  </mc:AlternateContent>
+</p:sld>
+</file>
+
+<file path=ppt/slides/slide12.xml><?xml version="1.0" encoding="utf-8"?>
+<p:sld xmlns:a="http://schemas.openxmlformats.org/drawingml/2006/main" xmlns:r="http://schemas.openxmlformats.org/officeDocument/2006/relationships" xmlns:p="http://schemas.openxmlformats.org/presentationml/2006/main">
+  <p:cSld>
+    <p:bg>
+      <p:bgPr>
+        <a:solidFill>
+          <a:schemeClr val="tx1"/>
+        </a:solidFill>
+        <a:effectLst/>
+      </p:bgPr>
+    </p:bg>
+    <p:spTree>
+      <p:nvGrpSpPr>
+        <p:cNvPr id="1" name=""/>
+        <p:cNvGrpSpPr/>
+        <p:nvPr/>
+      </p:nvGrpSpPr>
+      <p:grpSpPr>
+        <a:xfrm>
+          <a:off x="0" y="0"/>
+          <a:ext cx="0" cy="0"/>
+          <a:chOff x="0" y="0"/>
+          <a:chExt cx="0" cy="0"/>
+        </a:xfrm>
+      </p:grpSpPr>
+      <p:sp>
+        <p:nvSpPr>
+          <p:cNvPr id="8" name="Title 12"/>
+          <p:cNvSpPr>
+            <a:spLocks noGrp="1"/>
+          </p:cNvSpPr>
+          <p:nvPr>
+            <p:ph type="title"/>
+          </p:nvPr>
+        </p:nvSpPr>
+        <p:spPr>
+          <a:xfrm>
+            <a:off x="686911" y="2895600"/>
+            <a:ext cx="10360501" cy="1223963"/>
+          </a:xfrm>
+        </p:spPr>
+        <p:txBody>
+          <a:bodyPr>
+            <a:normAutofit/>
+          </a:bodyPr>
+          <a:lstStyle/>
+          <a:p>
+            <a:pPr algn="ctr"/>
+            <a:r>
+              <a:rPr lang="en-US" sz="5400" dirty="0" smtClean="0">
+                <a:solidFill>
+                  <a:schemeClr val="bg1">
+                    <a:lumMod val="65000"/>
+                    <a:lumOff val="35000"/>
+                  </a:schemeClr>
+                </a:solidFill>
+                <a:latin typeface="CMU Sans Serif Demi Condensed" panose="02000706000000000000" pitchFamily="50" charset="0"/>
+                <a:ea typeface="CMU Sans Serif Demi Condensed" panose="02000706000000000000" pitchFamily="50" charset="0"/>
+                <a:cs typeface="CMU Sans Serif Demi Condensed" panose="02000706000000000000" pitchFamily="50" charset="0"/>
+              </a:rPr>
+              <a:t>THANK YOU FOR LISTENING</a:t>
+            </a:r>
+            <a:endParaRPr lang="en-US" sz="5400" dirty="0">
+              <a:solidFill>
+                <a:schemeClr val="bg1">
+                  <a:lumMod val="65000"/>
+                  <a:lumOff val="35000"/>
+                </a:schemeClr>
+              </a:solidFill>
+              <a:latin typeface="CMU Sans Serif Demi Condensed" panose="02000706000000000000" pitchFamily="50" charset="0"/>
+              <a:ea typeface="CMU Sans Serif Demi Condensed" panose="02000706000000000000" pitchFamily="50" charset="0"/>
+              <a:cs typeface="CMU Sans Serif Demi Condensed" panose="02000706000000000000" pitchFamily="50" charset="0"/>
+            </a:endParaRPr>
+          </a:p>
+        </p:txBody>
+      </p:sp>
+      <p:sp>
+        <p:nvSpPr>
+          <p:cNvPr id="39" name="TextBox 38"/>
+          <p:cNvSpPr txBox="1"/>
+          <p:nvPr/>
+        </p:nvSpPr>
+        <p:spPr>
+          <a:xfrm>
+            <a:off x="1400092" y="2895600"/>
             <a:ext cx="6751720" cy="400110"/>
           </a:xfrm>
           <a:prstGeom prst="rect">
@@ -7074,17 +8534,6 @@
               </a:rPr>
               <a:t>https://github.com/gear/PLB-2015F-ARGame</a:t>
             </a:r>
-            <a:endParaRPr lang="en-US" sz="1800" dirty="0">
-              <a:solidFill>
-                <a:schemeClr val="bg1">
-                  <a:lumMod val="65000"/>
-                  <a:lumOff val="35000"/>
-                </a:schemeClr>
-              </a:solidFill>
-              <a:latin typeface="CMU Typewriter Text" panose="02000309000000000000" pitchFamily="49" charset="0"/>
-              <a:ea typeface="CMU Typewriter Text" panose="02000309000000000000" pitchFamily="49" charset="0"/>
-              <a:cs typeface="CMU Typewriter Text" panose="02000309000000000000" pitchFamily="49" charset="0"/>
-            </a:endParaRPr>
           </a:p>
         </p:txBody>
       </p:sp>
@@ -7212,17 +8661,6 @@
               </a:rPr>
               <a:t>Demo of our prototype.</a:t>
             </a:r>
-            <a:endParaRPr lang="en-US" dirty="0" smtClean="0">
-              <a:solidFill>
-                <a:schemeClr val="bg1">
-                  <a:lumMod val="65000"/>
-                  <a:lumOff val="35000"/>
-                </a:schemeClr>
-              </a:solidFill>
-              <a:latin typeface="CMU Bright" panose="02000603000000000000" pitchFamily="50" charset="0"/>
-              <a:ea typeface="CMU Bright" panose="02000603000000000000" pitchFamily="50" charset="0"/>
-              <a:cs typeface="CMU Bright" panose="02000603000000000000" pitchFamily="50" charset="0"/>
-            </a:endParaRPr>
           </a:p>
           <a:p>
             <a:r>
@@ -7239,17 +8677,6 @@
               </a:rPr>
               <a:t>Project overview &amp; Subprojects assignment.</a:t>
             </a:r>
-            <a:endParaRPr lang="en-US" dirty="0" smtClean="0">
-              <a:solidFill>
-                <a:schemeClr val="bg1">
-                  <a:lumMod val="65000"/>
-                  <a:lumOff val="35000"/>
-                </a:schemeClr>
-              </a:solidFill>
-              <a:latin typeface="CMU Bright" panose="02000603000000000000" pitchFamily="50" charset="0"/>
-              <a:ea typeface="CMU Bright" panose="02000603000000000000" pitchFamily="50" charset="0"/>
-              <a:cs typeface="CMU Bright" panose="02000603000000000000" pitchFamily="50" charset="0"/>
-            </a:endParaRPr>
           </a:p>
           <a:p>
             <a:r>
@@ -7618,7 +9045,6 @@
               <a:rPr lang="en-US" sz="2800" dirty="0"/>
               <a:t>2</a:t>
             </a:r>
-            <a:endParaRPr lang="en-US" sz="2800" dirty="0"/>
           </a:p>
         </p:txBody>
       </p:sp>
@@ -7802,39 +9228,6 @@
           </a:p>
         </p:txBody>
       </p:sp>
-      <p:pic>
-        <p:nvPicPr>
-          <p:cNvPr id="9" name="Short video clip-nature.mp4-SD">
-            <a:hlinkClick r:id="" action="ppaction://media"/>
-          </p:cNvPr>
-          <p:cNvPicPr>
-            <a:picLocks noChangeAspect="1"/>
-          </p:cNvPicPr>
-          <p:nvPr>
-            <a:videoFile r:link="rId2"/>
-            <p:extLst>
-              <p:ext uri="{DAA4B4D4-6D71-4841-9C94-3DE7FCFB9230}">
-                <p14:media xmlns:p14="http://schemas.microsoft.com/office/powerpoint/2010/main" r:embed="rId1"/>
-              </p:ext>
-            </p:extLst>
-          </p:nvPr>
-        </p:nvPicPr>
-        <p:blipFill>
-          <a:blip r:embed="rId4"/>
-          <a:stretch>
-            <a:fillRect/>
-          </a:stretch>
-        </p:blipFill>
-        <p:spPr>
-          <a:xfrm>
-            <a:off x="1446212" y="1676400"/>
-            <a:ext cx="5562600" cy="4171950"/>
-          </a:xfrm>
-          <a:prstGeom prst="rect">
-            <a:avLst/>
-          </a:prstGeom>
-        </p:spPr>
-      </p:pic>
       <p:sp>
         <p:nvSpPr>
           <p:cNvPr id="10" name="Diagonal Stripe 9"/>
@@ -7960,21 +9353,7 @@
                 <a:ea typeface="CMU Bright" panose="02000603000000000000" pitchFamily="50" charset="0"/>
                 <a:cs typeface="CMU Bright" panose="02000603000000000000" pitchFamily="50" charset="0"/>
               </a:rPr>
-              <a:t>Spin ball and hit nodes to earn extra bonus</a:t>
-            </a:r>
-            <a:r>
-              <a:rPr lang="en-US" dirty="0" smtClean="0">
-                <a:solidFill>
-                  <a:schemeClr val="bg1">
-                    <a:lumMod val="65000"/>
-                    <a:lumOff val="35000"/>
-                  </a:schemeClr>
-                </a:solidFill>
-                <a:latin typeface="CMU Bright" panose="02000603000000000000" pitchFamily="50" charset="0"/>
-                <a:ea typeface="CMU Bright" panose="02000603000000000000" pitchFamily="50" charset="0"/>
-                <a:cs typeface="CMU Bright" panose="02000603000000000000" pitchFamily="50" charset="0"/>
-              </a:rPr>
-              <a:t>.</a:t>
+              <a:t>Spin ball and hit nodes to earn extra bonus.</a:t>
             </a:r>
           </a:p>
           <a:p>
@@ -8002,6 +9381,50 @@
               <a:latin typeface="CMU Bright" panose="02000603000000000000" pitchFamily="50" charset="0"/>
               <a:ea typeface="CMU Bright" panose="02000603000000000000" pitchFamily="50" charset="0"/>
               <a:cs typeface="CMU Bright" panose="02000603000000000000" pitchFamily="50" charset="0"/>
+            </a:endParaRPr>
+          </a:p>
+        </p:txBody>
+      </p:sp>
+      <p:sp>
+        <p:nvSpPr>
+          <p:cNvPr id="2" name="TextBox 1"/>
+          <p:cNvSpPr txBox="1"/>
+          <p:nvPr/>
+        </p:nvSpPr>
+        <p:spPr>
+          <a:xfrm>
+            <a:off x="2055812" y="3048000"/>
+            <a:ext cx="3897221" cy="830997"/>
+          </a:xfrm>
+          <a:prstGeom prst="rect">
+            <a:avLst/>
+          </a:prstGeom>
+          <a:noFill/>
+        </p:spPr>
+        <p:txBody>
+          <a:bodyPr wrap="none" rtlCol="0">
+            <a:spAutoFit/>
+          </a:bodyPr>
+          <a:lstStyle/>
+          <a:p>
+            <a:r>
+              <a:rPr lang="en-US" sz="4800" dirty="0" smtClean="0">
+                <a:solidFill>
+                  <a:schemeClr val="bg1">
+                    <a:lumMod val="65000"/>
+                    <a:lumOff val="35000"/>
+                  </a:schemeClr>
+                </a:solidFill>
+              </a:rPr>
+              <a:t>[DEMO VIDEO]</a:t>
+            </a:r>
+            <a:endParaRPr lang="en-US" sz="4800" dirty="0">
+              <a:solidFill>
+                <a:schemeClr val="bg1">
+                  <a:lumMod val="65000"/>
+                  <a:lumOff val="35000"/>
+                </a:schemeClr>
+              </a:solidFill>
             </a:endParaRPr>
           </a:p>
         </p:txBody>
@@ -8028,86 +9451,6 @@
       </p:transition>
     </mc:Fallback>
   </mc:AlternateContent>
-  <p:timing>
-    <p:tnLst>
-      <p:par>
-        <p:cTn id="1" dur="indefinite" restart="never" nodeType="tmRoot">
-          <p:childTnLst>
-            <p:seq concurrent="1" nextAc="seek">
-              <p:cTn id="2" restart="whenNotActive" fill="hold" evtFilter="cancelBubble" nodeType="interactiveSeq">
-                <p:stCondLst>
-                  <p:cond evt="onClick" delay="0">
-                    <p:tgtEl>
-                      <p:spTgt spid="9"/>
-                    </p:tgtEl>
-                  </p:cond>
-                </p:stCondLst>
-                <p:endSync evt="end" delay="0">
-                  <p:rtn val="all"/>
-                </p:endSync>
-                <p:childTnLst>
-                  <p:par>
-                    <p:cTn id="3" fill="hold">
-                      <p:stCondLst>
-                        <p:cond delay="0"/>
-                      </p:stCondLst>
-                      <p:childTnLst>
-                        <p:par>
-                          <p:cTn id="4" fill="hold">
-                            <p:stCondLst>
-                              <p:cond delay="0"/>
-                            </p:stCondLst>
-                            <p:childTnLst>
-                              <p:par>
-                                <p:cTn id="5" presetID="2" presetClass="mediacall" presetSubtype="0" fill="hold" nodeType="clickEffect">
-                                  <p:stCondLst>
-                                    <p:cond delay="0"/>
-                                  </p:stCondLst>
-                                  <p:childTnLst>
-                                    <p:cmd type="call" cmd="togglePause">
-                                      <p:cBhvr>
-                                        <p:cTn id="6" dur="1" fill="hold"/>
-                                        <p:tgtEl>
-                                          <p:spTgt spid="9"/>
-                                        </p:tgtEl>
-                                      </p:cBhvr>
-                                    </p:cmd>
-                                  </p:childTnLst>
-                                </p:cTn>
-                              </p:par>
-                            </p:childTnLst>
-                          </p:cTn>
-                        </p:par>
-                      </p:childTnLst>
-                    </p:cTn>
-                  </p:par>
-                </p:childTnLst>
-              </p:cTn>
-              <p:nextCondLst>
-                <p:cond evt="onClick" delay="0">
-                  <p:tgtEl>
-                    <p:spTgt spid="9"/>
-                  </p:tgtEl>
-                </p:cond>
-              </p:nextCondLst>
-            </p:seq>
-            <p:video fullScrn="1">
-              <p:cMediaNode vol="80000">
-                <p:cTn id="7" fill="hold" display="0">
-                  <p:stCondLst>
-                    <p:cond delay="indefinite"/>
-                  </p:stCondLst>
-                </p:cTn>
-                <p:tgtEl>
-                  <p:spTgt spid="9"/>
-                </p:tgtEl>
-              </p:cMediaNode>
-            </p:video>
-          </p:childTnLst>
-        </p:cTn>
-      </p:par>
-    </p:tnLst>
-  </p:timing>
 </p:sld>
 </file>
 
@@ -10297,7 +11640,6 @@
               <a:rPr lang="en-US" sz="2800" dirty="0"/>
               <a:t>6</a:t>
             </a:r>
-            <a:endParaRPr lang="en-US" sz="2800" dirty="0"/>
           </a:p>
         </p:txBody>
       </p:sp>
@@ -11625,21 +12967,7 @@
                 <a:ea typeface="CMU Bright" panose="02000603000000000000" pitchFamily="50" charset="0"/>
                 <a:cs typeface="CMU Bright" panose="02000603000000000000" pitchFamily="50" charset="0"/>
               </a:rPr>
-              <a:t>Throwing ball </a:t>
-            </a:r>
-            <a:r>
-              <a:rPr lang="en-US" dirty="0" smtClean="0">
-                <a:solidFill>
-                  <a:schemeClr val="bg1">
-                    <a:lumMod val="65000"/>
-                    <a:lumOff val="35000"/>
-                  </a:schemeClr>
-                </a:solidFill>
-                <a:latin typeface="CMU Bright" panose="02000603000000000000" pitchFamily="50" charset="0"/>
-                <a:ea typeface="CMU Bright" panose="02000603000000000000" pitchFamily="50" charset="0"/>
-                <a:cs typeface="CMU Bright" panose="02000603000000000000" pitchFamily="50" charset="0"/>
-              </a:rPr>
-              <a:t>to “kill off” disease is fun!</a:t>
+              <a:t>Throwing ball to “kill off” disease is fun!</a:t>
             </a:r>
             <a:endParaRPr lang="en-US" dirty="0">
               <a:solidFill>
@@ -12166,21 +13494,7 @@
                 <a:ea typeface="CMU Bright" panose="02000603000000000000" pitchFamily="50" charset="0"/>
                 <a:cs typeface="CMU Bright" panose="02000603000000000000" pitchFamily="50" charset="0"/>
               </a:rPr>
-              <a:t>Game </a:t>
-            </a:r>
-            <a:r>
-              <a:rPr lang="en-US" dirty="0" smtClean="0">
-                <a:solidFill>
-                  <a:schemeClr val="bg1">
-                    <a:lumMod val="65000"/>
-                    <a:lumOff val="35000"/>
-                  </a:schemeClr>
-                </a:solidFill>
-                <a:latin typeface="CMU Bright" panose="02000603000000000000" pitchFamily="50" charset="0"/>
-                <a:ea typeface="CMU Bright" panose="02000603000000000000" pitchFamily="50" charset="0"/>
-                <a:cs typeface="CMU Bright" panose="02000603000000000000" pitchFamily="50" charset="0"/>
-              </a:rPr>
-              <a:t>score is determined by the number of survivors.</a:t>
+              <a:t>Game score is determined by the number of survivors.</a:t>
             </a:r>
             <a:endParaRPr lang="en-US" dirty="0">
               <a:solidFill>

</xml_diff>